<commit_message>
Update content on camera2 api
</commit_message>
<xml_diff>
--- a/PPT/카메라 기반 실시간 영상처리 기능을 포함한 안드로이드 앱 개발 02.pptx
+++ b/PPT/카메라 기반 실시간 영상처리 기능을 포함한 안드로이드 앱 개발 02.pptx
@@ -26,8 +26,8 @@
     <p:sldId id="330" r:id="rId17"/>
     <p:sldId id="331" r:id="rId18"/>
     <p:sldId id="332" r:id="rId19"/>
-    <p:sldId id="333" r:id="rId20"/>
-    <p:sldId id="334" r:id="rId21"/>
+    <p:sldId id="334" r:id="rId20"/>
+    <p:sldId id="333" r:id="rId21"/>
     <p:sldId id="335" r:id="rId22"/>
     <p:sldId id="336" r:id="rId23"/>
     <p:sldId id="337" r:id="rId24"/>
@@ -227,7 +227,7 @@
           <a:p>
             <a:fld id="{CDA69884-0459-4538-A815-5CAB5C172DE3}" type="datetimeFigureOut">
               <a:rPr lang="ko-KR" altLang="en-US" smtClean="0"/>
-              <a:t>2021-01-27</a:t>
+              <a:t>2021-01-28</a:t>
             </a:fld>
             <a:endParaRPr lang="ko-KR" altLang="en-US"/>
           </a:p>
@@ -645,7 +645,7 @@
           <a:p>
             <a:fld id="{6D1E8B6A-FC58-4B22-822E-7F0C2F19AC93}" type="datetime1">
               <a:rPr lang="ko-KR" altLang="en-US" smtClean="0"/>
-              <a:t>2021-01-27</a:t>
+              <a:t>2021-01-28</a:t>
             </a:fld>
             <a:endParaRPr lang="ko-KR" altLang="en-US"/>
           </a:p>
@@ -998,7 +998,7 @@
           <a:p>
             <a:fld id="{6CDA57B6-AD91-4EE6-8307-BDD8AFE8465B}" type="datetime1">
               <a:rPr lang="ko-KR" altLang="en-US" smtClean="0"/>
-              <a:t>2021-01-27</a:t>
+              <a:t>2021-01-28</a:t>
             </a:fld>
             <a:endParaRPr lang="ko-KR" altLang="en-US"/>
           </a:p>
@@ -1206,7 +1206,7 @@
           <a:p>
             <a:fld id="{6FCFB8F9-A2D1-4CDD-8EA0-9443D9809EB6}" type="datetime1">
               <a:rPr lang="ko-KR" altLang="en-US" smtClean="0"/>
-              <a:t>2021-01-27</a:t>
+              <a:t>2021-01-28</a:t>
             </a:fld>
             <a:endParaRPr lang="ko-KR" altLang="en-US"/>
           </a:p>
@@ -1407,7 +1407,7 @@
           <a:p>
             <a:fld id="{EC030C3A-E902-47A9-BA9C-11978B5A3E10}" type="datetime1">
               <a:rPr lang="ko-KR" altLang="en-US" smtClean="0"/>
-              <a:t>2021-01-27</a:t>
+              <a:t>2021-01-28</a:t>
             </a:fld>
             <a:endParaRPr lang="ko-KR" altLang="en-US"/>
           </a:p>
@@ -1666,7 +1666,7 @@
           <a:p>
             <a:fld id="{8DB39BE6-B813-4A5C-8A37-A6914B452DC7}" type="datetime1">
               <a:rPr lang="ko-KR" altLang="en-US" smtClean="0"/>
-              <a:t>2021-01-27</a:t>
+              <a:t>2021-01-28</a:t>
             </a:fld>
             <a:endParaRPr lang="ko-KR" altLang="en-US"/>
           </a:p>
@@ -2298,7 +2298,7 @@
           <a:p>
             <a:fld id="{13B7845C-8DCF-4F56-9592-C5B4538B2D59}" type="datetime1">
               <a:rPr lang="ko-KR" altLang="en-US" smtClean="0"/>
-              <a:t>2021-01-27</a:t>
+              <a:t>2021-01-28</a:t>
             </a:fld>
             <a:endParaRPr lang="ko-KR" altLang="en-US"/>
           </a:p>
@@ -2710,7 +2710,7 @@
           <a:p>
             <a:fld id="{34599A19-BC3A-4199-AF4A-F4A516DD9F70}" type="datetime1">
               <a:rPr lang="ko-KR" altLang="en-US" smtClean="0"/>
-              <a:t>2021-01-27</a:t>
+              <a:t>2021-01-28</a:t>
             </a:fld>
             <a:endParaRPr lang="ko-KR" altLang="en-US"/>
           </a:p>
@@ -2851,7 +2851,7 @@
           <a:p>
             <a:fld id="{584E885B-2EEC-481A-B44F-181BECED58AA}" type="datetime1">
               <a:rPr lang="ko-KR" altLang="en-US" smtClean="0"/>
-              <a:t>2021-01-27</a:t>
+              <a:t>2021-01-28</a:t>
             </a:fld>
             <a:endParaRPr lang="ko-KR" altLang="en-US"/>
           </a:p>
@@ -3162,7 +3162,7 @@
           <a:p>
             <a:fld id="{6C2B06BA-3133-4624-B79F-FF22349E2C1E}" type="datetime1">
               <a:rPr lang="ko-KR" altLang="en-US" smtClean="0"/>
-              <a:t>2021-01-27</a:t>
+              <a:t>2021-01-28</a:t>
             </a:fld>
             <a:endParaRPr lang="ko-KR" altLang="en-US"/>
           </a:p>
@@ -3450,7 +3450,7 @@
           <a:p>
             <a:fld id="{E47BD7D1-EFD3-44A1-95BF-8EB6FF3658EA}" type="datetime1">
               <a:rPr lang="ko-KR" altLang="en-US" smtClean="0"/>
-              <a:t>2021-01-27</a:t>
+              <a:t>2021-01-28</a:t>
             </a:fld>
             <a:endParaRPr lang="ko-KR" altLang="en-US"/>
           </a:p>
@@ -3691,7 +3691,7 @@
           <a:p>
             <a:fld id="{6589BD89-8927-409C-83EE-D99DFD6DFDE6}" type="datetime1">
               <a:rPr lang="ko-KR" altLang="en-US" smtClean="0"/>
-              <a:t>2021-01-27</a:t>
+              <a:t>2021-01-28</a:t>
             </a:fld>
             <a:endParaRPr lang="ko-KR" altLang="en-US"/>
           </a:p>
@@ -8316,7 +8316,7 @@
         <p:spPr>
           <a:xfrm>
             <a:off x="700897" y="1140473"/>
-            <a:ext cx="10368722" cy="461665"/>
+            <a:ext cx="10368722" cy="738664"/>
           </a:xfrm>
           <a:prstGeom prst="rect">
             <a:avLst/>
@@ -8335,345 +8335,132 @@
             </a:pPr>
             <a:r>
               <a:rPr lang="en-US" altLang="ko-KR" sz="2400" dirty="0"/>
-              <a:t>Layout </a:t>
-            </a:r>
-            <a:r>
-              <a:rPr lang="ko-KR" altLang="en-US" sz="2400" dirty="0"/>
-              <a:t>구성</a:t>
-            </a:r>
-            <a:endParaRPr lang="en-US" altLang="ko-KR" sz="2400" dirty="0"/>
-          </a:p>
-        </p:txBody>
-      </p:sp>
-      <p:pic>
-        <p:nvPicPr>
-          <p:cNvPr id="8" name="그림 7">
-            <a:extLst>
-              <a:ext uri="{FF2B5EF4-FFF2-40B4-BE49-F238E27FC236}">
-                <a16:creationId xmlns:a16="http://schemas.microsoft.com/office/drawing/2014/main" id="{6D459909-C5F5-4050-8D38-DA39C2830D43}"/>
-              </a:ext>
-            </a:extLst>
-          </p:cNvPr>
-          <p:cNvPicPr>
-            <a:picLocks noChangeAspect="1"/>
-          </p:cNvPicPr>
+              <a:t>Manifest</a:t>
+            </a:r>
+          </a:p>
+          <a:p>
+            <a:pPr marL="742950" lvl="1" indent="-285750">
+              <a:buFont typeface="Arial" panose="020B0604020202020204" pitchFamily="34" charset="0"/>
+              <a:buChar char="•"/>
+            </a:pPr>
+            <a:r>
+              <a:rPr lang="en-US" altLang="ko-KR" dirty="0"/>
+              <a:t>Camera permission </a:t>
+            </a:r>
+            <a:r>
+              <a:rPr lang="ko-KR" altLang="en-US" dirty="0"/>
+              <a:t>부여</a:t>
+            </a:r>
+            <a:endParaRPr lang="en-US" altLang="ko-KR" dirty="0"/>
+          </a:p>
+        </p:txBody>
+      </p:sp>
+      <p:grpSp>
+        <p:nvGrpSpPr>
+          <p:cNvPr id="5" name="그룹 4">
+            <a:extLst>
+              <a:ext uri="{FF2B5EF4-FFF2-40B4-BE49-F238E27FC236}">
+                <a16:creationId xmlns:a16="http://schemas.microsoft.com/office/drawing/2014/main" id="{26CA1A1F-73A0-4B3A-BCD9-998D1D2842F1}"/>
+              </a:ext>
+            </a:extLst>
+          </p:cNvPr>
+          <p:cNvGrpSpPr/>
           <p:nvPr/>
-        </p:nvPicPr>
-        <p:blipFill>
-          <a:blip r:embed="rId2"/>
-          <a:stretch>
-            <a:fillRect/>
-          </a:stretch>
-        </p:blipFill>
-        <p:spPr>
+        </p:nvGrpSpPr>
+        <p:grpSpPr>
           <a:xfrm>
-            <a:off x="1101090" y="2169794"/>
-            <a:ext cx="4229100" cy="2914650"/>
+            <a:off x="3519487" y="2795209"/>
+            <a:ext cx="5153025" cy="2079531"/>
+            <a:chOff x="3457575" y="2782852"/>
+            <a:chExt cx="5153025" cy="2079531"/>
           </a:xfrm>
-          <a:prstGeom prst="rect">
-            <a:avLst/>
-          </a:prstGeom>
-        </p:spPr>
-      </p:pic>
-      <p:sp>
-        <p:nvSpPr>
-          <p:cNvPr id="9" name="직사각형 8">
-            <a:extLst>
-              <a:ext uri="{FF2B5EF4-FFF2-40B4-BE49-F238E27FC236}">
-                <a16:creationId xmlns:a16="http://schemas.microsoft.com/office/drawing/2014/main" id="{6A2F15CE-D2C0-4BEE-8745-332B0E48210F}"/>
-              </a:ext>
-            </a:extLst>
-          </p:cNvPr>
-          <p:cNvSpPr/>
-          <p:nvPr/>
-        </p:nvSpPr>
-        <p:spPr>
-          <a:xfrm>
-            <a:off x="6630439" y="2369083"/>
-            <a:ext cx="4141470" cy="2516073"/>
-          </a:xfrm>
-          <a:prstGeom prst="rect">
-            <a:avLst/>
-          </a:prstGeom>
-          <a:ln>
-            <a:solidFill>
-              <a:schemeClr val="tx1"/>
-            </a:solidFill>
-          </a:ln>
-        </p:spPr>
-        <p:txBody>
-          <a:bodyPr wrap="square">
-            <a:spAutoFit/>
-          </a:bodyPr>
-          <a:lstStyle/>
-          <a:p>
-            <a:r>
-              <a:rPr lang="ko-KR" altLang="en-US" sz="1050" dirty="0"/>
-              <a:t>&lt;?</a:t>
-            </a:r>
-            <a:r>
-              <a:rPr lang="ko-KR" altLang="en-US" sz="1050" dirty="0" err="1"/>
-              <a:t>xml</a:t>
-            </a:r>
-            <a:r>
-              <a:rPr lang="ko-KR" altLang="en-US" sz="1050" dirty="0"/>
-              <a:t> </a:t>
-            </a:r>
-            <a:r>
-              <a:rPr lang="ko-KR" altLang="en-US" sz="1050" dirty="0" err="1"/>
-              <a:t>version</a:t>
-            </a:r>
-            <a:r>
-              <a:rPr lang="ko-KR" altLang="en-US" sz="1050" dirty="0"/>
-              <a:t>="1.0" </a:t>
-            </a:r>
-            <a:r>
-              <a:rPr lang="ko-KR" altLang="en-US" sz="1050" dirty="0" err="1"/>
-              <a:t>encoding</a:t>
-            </a:r>
-            <a:r>
-              <a:rPr lang="ko-KR" altLang="en-US" sz="1050" dirty="0"/>
-              <a:t>="utf-8"?&gt;</a:t>
-            </a:r>
-          </a:p>
-          <a:p>
-            <a:r>
-              <a:rPr lang="ko-KR" altLang="en-US" sz="1050" dirty="0"/>
-              <a:t>&lt;</a:t>
-            </a:r>
-            <a:r>
-              <a:rPr lang="ko-KR" altLang="en-US" sz="1050" dirty="0" err="1"/>
-              <a:t>LinearLayout</a:t>
-            </a:r>
-            <a:endParaRPr lang="ko-KR" altLang="en-US" sz="1050" dirty="0"/>
-          </a:p>
-          <a:p>
-            <a:r>
-              <a:rPr lang="ko-KR" altLang="en-US" sz="1050" dirty="0"/>
-              <a:t>    </a:t>
-            </a:r>
-            <a:r>
-              <a:rPr lang="ko-KR" altLang="en-US" sz="1050" dirty="0" err="1"/>
-              <a:t>xmlns:android</a:t>
-            </a:r>
-            <a:r>
-              <a:rPr lang="ko-KR" altLang="en-US" sz="1050" dirty="0"/>
-              <a:t>="http://schemas.android.com/apk/res/android"</a:t>
-            </a:r>
-          </a:p>
-          <a:p>
-            <a:r>
-              <a:rPr lang="ko-KR" altLang="en-US" sz="1050" dirty="0"/>
-              <a:t>    </a:t>
-            </a:r>
-            <a:r>
-              <a:rPr lang="ko-KR" altLang="en-US" sz="1050" dirty="0" err="1"/>
-              <a:t>xmlns:tools</a:t>
-            </a:r>
-            <a:r>
-              <a:rPr lang="ko-KR" altLang="en-US" sz="1050" dirty="0"/>
-              <a:t>="http://schemas.android.com/tools"</a:t>
-            </a:r>
-          </a:p>
-          <a:p>
-            <a:r>
-              <a:rPr lang="ko-KR" altLang="en-US" sz="1050" dirty="0"/>
-              <a:t>    </a:t>
-            </a:r>
-            <a:r>
-              <a:rPr lang="ko-KR" altLang="en-US" sz="1050" dirty="0" err="1"/>
-              <a:t>android:layout_width</a:t>
-            </a:r>
-            <a:r>
-              <a:rPr lang="ko-KR" altLang="en-US" sz="1050" dirty="0"/>
-              <a:t>="</a:t>
-            </a:r>
-            <a:r>
-              <a:rPr lang="ko-KR" altLang="en-US" sz="1050" dirty="0" err="1"/>
-              <a:t>match_parent</a:t>
-            </a:r>
-            <a:r>
-              <a:rPr lang="ko-KR" altLang="en-US" sz="1050" dirty="0"/>
-              <a:t>"</a:t>
-            </a:r>
-          </a:p>
-          <a:p>
-            <a:r>
-              <a:rPr lang="ko-KR" altLang="en-US" sz="1050" dirty="0"/>
-              <a:t>    </a:t>
-            </a:r>
-            <a:r>
-              <a:rPr lang="ko-KR" altLang="en-US" sz="1050" dirty="0" err="1"/>
-              <a:t>android:layout_height</a:t>
-            </a:r>
-            <a:r>
-              <a:rPr lang="ko-KR" altLang="en-US" sz="1050" dirty="0"/>
-              <a:t>="</a:t>
-            </a:r>
-            <a:r>
-              <a:rPr lang="ko-KR" altLang="en-US" sz="1050" dirty="0" err="1"/>
-              <a:t>match_parent</a:t>
-            </a:r>
-            <a:r>
-              <a:rPr lang="ko-KR" altLang="en-US" sz="1050" dirty="0"/>
-              <a:t>"</a:t>
-            </a:r>
-          </a:p>
-          <a:p>
-            <a:r>
-              <a:rPr lang="ko-KR" altLang="en-US" sz="1050" dirty="0"/>
-              <a:t>    </a:t>
-            </a:r>
-            <a:r>
-              <a:rPr lang="ko-KR" altLang="en-US" sz="1050" dirty="0" err="1"/>
-              <a:t>android:orientation</a:t>
-            </a:r>
-            <a:r>
-              <a:rPr lang="ko-KR" altLang="en-US" sz="1050" dirty="0"/>
-              <a:t>="</a:t>
-            </a:r>
-            <a:r>
-              <a:rPr lang="ko-KR" altLang="en-US" sz="1050" dirty="0" err="1"/>
-              <a:t>vertical</a:t>
-            </a:r>
-            <a:r>
-              <a:rPr lang="ko-KR" altLang="en-US" sz="1050" dirty="0"/>
-              <a:t>"</a:t>
-            </a:r>
-          </a:p>
-          <a:p>
-            <a:r>
-              <a:rPr lang="ko-KR" altLang="en-US" sz="1050" dirty="0"/>
-              <a:t>    </a:t>
-            </a:r>
-            <a:r>
-              <a:rPr lang="ko-KR" altLang="en-US" sz="1050" dirty="0" err="1"/>
-              <a:t>tools:context</a:t>
-            </a:r>
-            <a:r>
-              <a:rPr lang="ko-KR" altLang="en-US" sz="1050" dirty="0"/>
-              <a:t>=".</a:t>
-            </a:r>
-            <a:r>
-              <a:rPr lang="ko-KR" altLang="en-US" sz="1050" dirty="0" err="1"/>
-              <a:t>MainActivity</a:t>
-            </a:r>
-            <a:r>
-              <a:rPr lang="ko-KR" altLang="en-US" sz="1050" dirty="0"/>
-              <a:t>"&gt;</a:t>
-            </a:r>
-          </a:p>
-          <a:p>
-            <a:endParaRPr lang="ko-KR" altLang="en-US" sz="1050" dirty="0"/>
-          </a:p>
-          <a:p>
-            <a:r>
-              <a:rPr lang="ko-KR" altLang="en-US" sz="1050" dirty="0"/>
-              <a:t>    &lt;</a:t>
-            </a:r>
-            <a:r>
-              <a:rPr lang="ko-KR" altLang="en-US" sz="1050" dirty="0" err="1"/>
-              <a:t>org.opencv.android.JavaCameraView</a:t>
-            </a:r>
-            <a:endParaRPr lang="ko-KR" altLang="en-US" sz="1050" dirty="0"/>
-          </a:p>
-          <a:p>
-            <a:r>
-              <a:rPr lang="ko-KR" altLang="en-US" sz="1050" dirty="0"/>
-              <a:t>        </a:t>
-            </a:r>
-            <a:r>
-              <a:rPr lang="ko-KR" altLang="en-US" sz="1050" dirty="0" err="1"/>
-              <a:t>android:layout_width</a:t>
-            </a:r>
-            <a:r>
-              <a:rPr lang="ko-KR" altLang="en-US" sz="1050" dirty="0"/>
-              <a:t>="</a:t>
-            </a:r>
-            <a:r>
-              <a:rPr lang="ko-KR" altLang="en-US" sz="1050" dirty="0" err="1"/>
-              <a:t>match_parent</a:t>
-            </a:r>
-            <a:r>
-              <a:rPr lang="ko-KR" altLang="en-US" sz="1050" dirty="0"/>
-              <a:t>"</a:t>
-            </a:r>
-          </a:p>
-          <a:p>
-            <a:r>
-              <a:rPr lang="ko-KR" altLang="en-US" sz="1050" dirty="0"/>
-              <a:t>        </a:t>
-            </a:r>
-            <a:r>
-              <a:rPr lang="ko-KR" altLang="en-US" sz="1050" dirty="0" err="1"/>
-              <a:t>android:layout_height</a:t>
-            </a:r>
-            <a:r>
-              <a:rPr lang="ko-KR" altLang="en-US" sz="1050" dirty="0"/>
-              <a:t>="</a:t>
-            </a:r>
-            <a:r>
-              <a:rPr lang="ko-KR" altLang="en-US" sz="1050" dirty="0" err="1"/>
-              <a:t>match_parent</a:t>
-            </a:r>
-            <a:r>
-              <a:rPr lang="ko-KR" altLang="en-US" sz="1050" dirty="0"/>
-              <a:t>"</a:t>
-            </a:r>
-          </a:p>
-          <a:p>
-            <a:r>
-              <a:rPr lang="ko-KR" altLang="en-US" sz="1050" dirty="0"/>
-              <a:t>        </a:t>
-            </a:r>
-            <a:r>
-              <a:rPr lang="ko-KR" altLang="en-US" sz="1050" dirty="0" err="1"/>
-              <a:t>android:id</a:t>
-            </a:r>
-            <a:r>
-              <a:rPr lang="ko-KR" altLang="en-US" sz="1050" dirty="0"/>
-              <a:t>="@+</a:t>
-            </a:r>
-            <a:r>
-              <a:rPr lang="ko-KR" altLang="en-US" sz="1050" dirty="0" err="1"/>
-              <a:t>id</a:t>
-            </a:r>
-            <a:r>
-              <a:rPr lang="ko-KR" altLang="en-US" sz="1050" dirty="0"/>
-              <a:t>/</a:t>
-            </a:r>
-            <a:r>
-              <a:rPr lang="ko-KR" altLang="en-US" sz="1050" dirty="0" err="1"/>
-              <a:t>camera_view</a:t>
-            </a:r>
-            <a:r>
-              <a:rPr lang="ko-KR" altLang="en-US" sz="1050" dirty="0"/>
-              <a:t>" /&gt;</a:t>
-            </a:r>
-          </a:p>
-          <a:p>
-            <a:endParaRPr lang="ko-KR" altLang="en-US" sz="1050" dirty="0"/>
-          </a:p>
-          <a:p>
-            <a:r>
-              <a:rPr lang="ko-KR" altLang="en-US" sz="1050" dirty="0"/>
-              <a:t>&lt;/</a:t>
-            </a:r>
-            <a:r>
-              <a:rPr lang="ko-KR" altLang="en-US" sz="1050" dirty="0" err="1"/>
-              <a:t>LinearLayout</a:t>
-            </a:r>
-            <a:r>
-              <a:rPr lang="ko-KR" altLang="en-US" sz="1050" dirty="0"/>
-              <a:t>&gt;</a:t>
-            </a:r>
-          </a:p>
-        </p:txBody>
-      </p:sp>
+        </p:grpSpPr>
+        <p:pic>
+          <p:nvPicPr>
+            <p:cNvPr id="10" name="그림 9">
+              <a:extLst>
+                <a:ext uri="{FF2B5EF4-FFF2-40B4-BE49-F238E27FC236}">
+                  <a16:creationId xmlns:a16="http://schemas.microsoft.com/office/drawing/2014/main" id="{BAD7DC0A-C3E8-4D8A-AEE6-EEF32EEAE65D}"/>
+                </a:ext>
+              </a:extLst>
+            </p:cNvPr>
+            <p:cNvPicPr>
+              <a:picLocks noChangeAspect="1"/>
+            </p:cNvPicPr>
+            <p:nvPr/>
+          </p:nvPicPr>
+          <p:blipFill rotWithShape="1">
+            <a:blip r:embed="rId2"/>
+            <a:srcRect b="54326"/>
+            <a:stretch/>
+          </p:blipFill>
+          <p:spPr>
+            <a:xfrm>
+              <a:off x="3457575" y="2782852"/>
+              <a:ext cx="5153025" cy="2079531"/>
+            </a:xfrm>
+            <a:prstGeom prst="rect">
+              <a:avLst/>
+            </a:prstGeom>
+          </p:spPr>
+        </p:pic>
+        <p:sp>
+          <p:nvSpPr>
+            <p:cNvPr id="11" name="직사각형 10">
+              <a:extLst>
+                <a:ext uri="{FF2B5EF4-FFF2-40B4-BE49-F238E27FC236}">
+                  <a16:creationId xmlns:a16="http://schemas.microsoft.com/office/drawing/2014/main" id="{5D010644-FC5B-47CF-90CF-1028A77FF6FB}"/>
+                </a:ext>
+              </a:extLst>
+            </p:cNvPr>
+            <p:cNvSpPr/>
+            <p:nvPr/>
+          </p:nvSpPr>
+          <p:spPr>
+            <a:xfrm>
+              <a:off x="3682256" y="3512718"/>
+              <a:ext cx="4402881" cy="281371"/>
+            </a:xfrm>
+            <a:prstGeom prst="rect">
+              <a:avLst/>
+            </a:prstGeom>
+            <a:noFill/>
+            <a:ln w="38100">
+              <a:solidFill>
+                <a:srgbClr val="FF0000"/>
+              </a:solidFill>
+            </a:ln>
+          </p:spPr>
+          <p:style>
+            <a:lnRef idx="2">
+              <a:schemeClr val="accent1">
+                <a:shade val="50000"/>
+              </a:schemeClr>
+            </a:lnRef>
+            <a:fillRef idx="1">
+              <a:schemeClr val="accent1"/>
+            </a:fillRef>
+            <a:effectRef idx="0">
+              <a:schemeClr val="accent1"/>
+            </a:effectRef>
+            <a:fontRef idx="minor">
+              <a:schemeClr val="lt1"/>
+            </a:fontRef>
+          </p:style>
+          <p:txBody>
+            <a:bodyPr rtlCol="0" anchor="ctr"/>
+            <a:lstStyle/>
+            <a:p>
+              <a:pPr algn="ctr"/>
+              <a:endParaRPr lang="ko-KR" altLang="en-US" dirty="0"/>
+            </a:p>
+          </p:txBody>
+        </p:sp>
+      </p:grpSp>
     </p:spTree>
     <p:extLst>
       <p:ext uri="{BB962C8B-B14F-4D97-AF65-F5344CB8AC3E}">
-        <p14:creationId xmlns:p14="http://schemas.microsoft.com/office/powerpoint/2010/main" val="140618883"/>
+        <p14:creationId xmlns:p14="http://schemas.microsoft.com/office/powerpoint/2010/main" val="2610458175"/>
       </p:ext>
     </p:extLst>
   </p:cSld>
@@ -9437,7 +9224,7 @@
         <p:spPr>
           <a:xfrm>
             <a:off x="700897" y="1140473"/>
-            <a:ext cx="10368722" cy="738664"/>
+            <a:ext cx="10368722" cy="461665"/>
           </a:xfrm>
           <a:prstGeom prst="rect">
             <a:avLst/>
@@ -9456,132 +9243,345 @@
             </a:pPr>
             <a:r>
               <a:rPr lang="en-US" altLang="ko-KR" sz="2400" dirty="0"/>
-              <a:t>Manifest</a:t>
-            </a:r>
-          </a:p>
-          <a:p>
-            <a:pPr marL="742950" lvl="1" indent="-285750">
-              <a:buFont typeface="Arial" panose="020B0604020202020204" pitchFamily="34" charset="0"/>
-              <a:buChar char="•"/>
-            </a:pPr>
-            <a:r>
-              <a:rPr lang="en-US" altLang="ko-KR" dirty="0"/>
-              <a:t>Camera permission </a:t>
-            </a:r>
-            <a:r>
-              <a:rPr lang="ko-KR" altLang="en-US" dirty="0"/>
-              <a:t>부여</a:t>
-            </a:r>
-            <a:endParaRPr lang="en-US" altLang="ko-KR" dirty="0"/>
-          </a:p>
-        </p:txBody>
-      </p:sp>
-      <p:grpSp>
-        <p:nvGrpSpPr>
-          <p:cNvPr id="5" name="그룹 4">
-            <a:extLst>
-              <a:ext uri="{FF2B5EF4-FFF2-40B4-BE49-F238E27FC236}">
-                <a16:creationId xmlns:a16="http://schemas.microsoft.com/office/drawing/2014/main" id="{26CA1A1F-73A0-4B3A-BCD9-998D1D2842F1}"/>
-              </a:ext>
-            </a:extLst>
-          </p:cNvPr>
-          <p:cNvGrpSpPr/>
+              <a:t>Layout </a:t>
+            </a:r>
+            <a:r>
+              <a:rPr lang="ko-KR" altLang="en-US" sz="2400" dirty="0"/>
+              <a:t>구성</a:t>
+            </a:r>
+            <a:endParaRPr lang="en-US" altLang="ko-KR" sz="2400" dirty="0"/>
+          </a:p>
+        </p:txBody>
+      </p:sp>
+      <p:pic>
+        <p:nvPicPr>
+          <p:cNvPr id="8" name="그림 7">
+            <a:extLst>
+              <a:ext uri="{FF2B5EF4-FFF2-40B4-BE49-F238E27FC236}">
+                <a16:creationId xmlns:a16="http://schemas.microsoft.com/office/drawing/2014/main" id="{6D459909-C5F5-4050-8D38-DA39C2830D43}"/>
+              </a:ext>
+            </a:extLst>
+          </p:cNvPr>
+          <p:cNvPicPr>
+            <a:picLocks noChangeAspect="1"/>
+          </p:cNvPicPr>
           <p:nvPr/>
-        </p:nvGrpSpPr>
-        <p:grpSpPr>
+        </p:nvPicPr>
+        <p:blipFill>
+          <a:blip r:embed="rId2"/>
+          <a:stretch>
+            <a:fillRect/>
+          </a:stretch>
+        </p:blipFill>
+        <p:spPr>
           <a:xfrm>
-            <a:off x="3519487" y="2795209"/>
-            <a:ext cx="5153025" cy="2079531"/>
-            <a:chOff x="3457575" y="2782852"/>
-            <a:chExt cx="5153025" cy="2079531"/>
+            <a:off x="1101090" y="2169794"/>
+            <a:ext cx="4229100" cy="2914650"/>
           </a:xfrm>
-        </p:grpSpPr>
-        <p:pic>
-          <p:nvPicPr>
-            <p:cNvPr id="10" name="그림 9">
-              <a:extLst>
-                <a:ext uri="{FF2B5EF4-FFF2-40B4-BE49-F238E27FC236}">
-                  <a16:creationId xmlns:a16="http://schemas.microsoft.com/office/drawing/2014/main" id="{BAD7DC0A-C3E8-4D8A-AEE6-EEF32EEAE65D}"/>
-                </a:ext>
-              </a:extLst>
-            </p:cNvPr>
-            <p:cNvPicPr>
-              <a:picLocks noChangeAspect="1"/>
-            </p:cNvPicPr>
-            <p:nvPr/>
-          </p:nvPicPr>
-          <p:blipFill rotWithShape="1">
-            <a:blip r:embed="rId2"/>
-            <a:srcRect b="54326"/>
-            <a:stretch/>
-          </p:blipFill>
-          <p:spPr>
-            <a:xfrm>
-              <a:off x="3457575" y="2782852"/>
-              <a:ext cx="5153025" cy="2079531"/>
-            </a:xfrm>
-            <a:prstGeom prst="rect">
-              <a:avLst/>
-            </a:prstGeom>
-          </p:spPr>
-        </p:pic>
-        <p:sp>
-          <p:nvSpPr>
-            <p:cNvPr id="11" name="직사각형 10">
-              <a:extLst>
-                <a:ext uri="{FF2B5EF4-FFF2-40B4-BE49-F238E27FC236}">
-                  <a16:creationId xmlns:a16="http://schemas.microsoft.com/office/drawing/2014/main" id="{5D010644-FC5B-47CF-90CF-1028A77FF6FB}"/>
-                </a:ext>
-              </a:extLst>
-            </p:cNvPr>
-            <p:cNvSpPr/>
-            <p:nvPr/>
-          </p:nvSpPr>
-          <p:spPr>
-            <a:xfrm>
-              <a:off x="3682256" y="3512718"/>
-              <a:ext cx="4402881" cy="281371"/>
-            </a:xfrm>
-            <a:prstGeom prst="rect">
-              <a:avLst/>
-            </a:prstGeom>
-            <a:noFill/>
-            <a:ln w="38100">
-              <a:solidFill>
-                <a:srgbClr val="FF0000"/>
-              </a:solidFill>
-            </a:ln>
-          </p:spPr>
-          <p:style>
-            <a:lnRef idx="2">
-              <a:schemeClr val="accent1">
-                <a:shade val="50000"/>
-              </a:schemeClr>
-            </a:lnRef>
-            <a:fillRef idx="1">
-              <a:schemeClr val="accent1"/>
-            </a:fillRef>
-            <a:effectRef idx="0">
-              <a:schemeClr val="accent1"/>
-            </a:effectRef>
-            <a:fontRef idx="minor">
-              <a:schemeClr val="lt1"/>
-            </a:fontRef>
-          </p:style>
-          <p:txBody>
-            <a:bodyPr rtlCol="0" anchor="ctr"/>
-            <a:lstStyle/>
-            <a:p>
-              <a:pPr algn="ctr"/>
-              <a:endParaRPr lang="ko-KR" altLang="en-US" dirty="0"/>
-            </a:p>
-          </p:txBody>
-        </p:sp>
-      </p:grpSp>
+          <a:prstGeom prst="rect">
+            <a:avLst/>
+          </a:prstGeom>
+        </p:spPr>
+      </p:pic>
+      <p:sp>
+        <p:nvSpPr>
+          <p:cNvPr id="9" name="직사각형 8">
+            <a:extLst>
+              <a:ext uri="{FF2B5EF4-FFF2-40B4-BE49-F238E27FC236}">
+                <a16:creationId xmlns:a16="http://schemas.microsoft.com/office/drawing/2014/main" id="{6A2F15CE-D2C0-4BEE-8745-332B0E48210F}"/>
+              </a:ext>
+            </a:extLst>
+          </p:cNvPr>
+          <p:cNvSpPr/>
+          <p:nvPr/>
+        </p:nvSpPr>
+        <p:spPr>
+          <a:xfrm>
+            <a:off x="6630439" y="2369083"/>
+            <a:ext cx="4141470" cy="2516073"/>
+          </a:xfrm>
+          <a:prstGeom prst="rect">
+            <a:avLst/>
+          </a:prstGeom>
+          <a:ln>
+            <a:solidFill>
+              <a:schemeClr val="tx1"/>
+            </a:solidFill>
+          </a:ln>
+        </p:spPr>
+        <p:txBody>
+          <a:bodyPr wrap="square">
+            <a:spAutoFit/>
+          </a:bodyPr>
+          <a:lstStyle/>
+          <a:p>
+            <a:r>
+              <a:rPr lang="ko-KR" altLang="en-US" sz="1050" dirty="0"/>
+              <a:t>&lt;?</a:t>
+            </a:r>
+            <a:r>
+              <a:rPr lang="ko-KR" altLang="en-US" sz="1050" dirty="0" err="1"/>
+              <a:t>xml</a:t>
+            </a:r>
+            <a:r>
+              <a:rPr lang="ko-KR" altLang="en-US" sz="1050" dirty="0"/>
+              <a:t> </a:t>
+            </a:r>
+            <a:r>
+              <a:rPr lang="ko-KR" altLang="en-US" sz="1050" dirty="0" err="1"/>
+              <a:t>version</a:t>
+            </a:r>
+            <a:r>
+              <a:rPr lang="ko-KR" altLang="en-US" sz="1050" dirty="0"/>
+              <a:t>="1.0" </a:t>
+            </a:r>
+            <a:r>
+              <a:rPr lang="ko-KR" altLang="en-US" sz="1050" dirty="0" err="1"/>
+              <a:t>encoding</a:t>
+            </a:r>
+            <a:r>
+              <a:rPr lang="ko-KR" altLang="en-US" sz="1050" dirty="0"/>
+              <a:t>="utf-8"?&gt;</a:t>
+            </a:r>
+          </a:p>
+          <a:p>
+            <a:r>
+              <a:rPr lang="ko-KR" altLang="en-US" sz="1050" dirty="0"/>
+              <a:t>&lt;</a:t>
+            </a:r>
+            <a:r>
+              <a:rPr lang="ko-KR" altLang="en-US" sz="1050" dirty="0" err="1"/>
+              <a:t>LinearLayout</a:t>
+            </a:r>
+            <a:endParaRPr lang="ko-KR" altLang="en-US" sz="1050" dirty="0"/>
+          </a:p>
+          <a:p>
+            <a:r>
+              <a:rPr lang="ko-KR" altLang="en-US" sz="1050" dirty="0"/>
+              <a:t>    </a:t>
+            </a:r>
+            <a:r>
+              <a:rPr lang="ko-KR" altLang="en-US" sz="1050" dirty="0" err="1"/>
+              <a:t>xmlns:android</a:t>
+            </a:r>
+            <a:r>
+              <a:rPr lang="ko-KR" altLang="en-US" sz="1050" dirty="0"/>
+              <a:t>="http://schemas.android.com/apk/res/android"</a:t>
+            </a:r>
+          </a:p>
+          <a:p>
+            <a:r>
+              <a:rPr lang="ko-KR" altLang="en-US" sz="1050" dirty="0"/>
+              <a:t>    </a:t>
+            </a:r>
+            <a:r>
+              <a:rPr lang="ko-KR" altLang="en-US" sz="1050" dirty="0" err="1"/>
+              <a:t>xmlns:tools</a:t>
+            </a:r>
+            <a:r>
+              <a:rPr lang="ko-KR" altLang="en-US" sz="1050" dirty="0"/>
+              <a:t>="http://schemas.android.com/tools"</a:t>
+            </a:r>
+          </a:p>
+          <a:p>
+            <a:r>
+              <a:rPr lang="ko-KR" altLang="en-US" sz="1050" dirty="0"/>
+              <a:t>    </a:t>
+            </a:r>
+            <a:r>
+              <a:rPr lang="ko-KR" altLang="en-US" sz="1050" dirty="0" err="1"/>
+              <a:t>android:layout_width</a:t>
+            </a:r>
+            <a:r>
+              <a:rPr lang="ko-KR" altLang="en-US" sz="1050" dirty="0"/>
+              <a:t>="</a:t>
+            </a:r>
+            <a:r>
+              <a:rPr lang="ko-KR" altLang="en-US" sz="1050" dirty="0" err="1"/>
+              <a:t>match_parent</a:t>
+            </a:r>
+            <a:r>
+              <a:rPr lang="ko-KR" altLang="en-US" sz="1050" dirty="0"/>
+              <a:t>"</a:t>
+            </a:r>
+          </a:p>
+          <a:p>
+            <a:r>
+              <a:rPr lang="ko-KR" altLang="en-US" sz="1050" dirty="0"/>
+              <a:t>    </a:t>
+            </a:r>
+            <a:r>
+              <a:rPr lang="ko-KR" altLang="en-US" sz="1050" dirty="0" err="1"/>
+              <a:t>android:layout_height</a:t>
+            </a:r>
+            <a:r>
+              <a:rPr lang="ko-KR" altLang="en-US" sz="1050" dirty="0"/>
+              <a:t>="</a:t>
+            </a:r>
+            <a:r>
+              <a:rPr lang="ko-KR" altLang="en-US" sz="1050" dirty="0" err="1"/>
+              <a:t>match_parent</a:t>
+            </a:r>
+            <a:r>
+              <a:rPr lang="ko-KR" altLang="en-US" sz="1050" dirty="0"/>
+              <a:t>"</a:t>
+            </a:r>
+          </a:p>
+          <a:p>
+            <a:r>
+              <a:rPr lang="ko-KR" altLang="en-US" sz="1050" dirty="0"/>
+              <a:t>    </a:t>
+            </a:r>
+            <a:r>
+              <a:rPr lang="ko-KR" altLang="en-US" sz="1050" dirty="0" err="1"/>
+              <a:t>android:orientation</a:t>
+            </a:r>
+            <a:r>
+              <a:rPr lang="ko-KR" altLang="en-US" sz="1050" dirty="0"/>
+              <a:t>="</a:t>
+            </a:r>
+            <a:r>
+              <a:rPr lang="ko-KR" altLang="en-US" sz="1050" dirty="0" err="1"/>
+              <a:t>vertical</a:t>
+            </a:r>
+            <a:r>
+              <a:rPr lang="ko-KR" altLang="en-US" sz="1050" dirty="0"/>
+              <a:t>"</a:t>
+            </a:r>
+          </a:p>
+          <a:p>
+            <a:r>
+              <a:rPr lang="ko-KR" altLang="en-US" sz="1050" dirty="0"/>
+              <a:t>    </a:t>
+            </a:r>
+            <a:r>
+              <a:rPr lang="ko-KR" altLang="en-US" sz="1050" dirty="0" err="1"/>
+              <a:t>tools:context</a:t>
+            </a:r>
+            <a:r>
+              <a:rPr lang="ko-KR" altLang="en-US" sz="1050" dirty="0"/>
+              <a:t>=".</a:t>
+            </a:r>
+            <a:r>
+              <a:rPr lang="ko-KR" altLang="en-US" sz="1050" dirty="0" err="1"/>
+              <a:t>MainActivity</a:t>
+            </a:r>
+            <a:r>
+              <a:rPr lang="ko-KR" altLang="en-US" sz="1050" dirty="0"/>
+              <a:t>"&gt;</a:t>
+            </a:r>
+          </a:p>
+          <a:p>
+            <a:endParaRPr lang="ko-KR" altLang="en-US" sz="1050" dirty="0"/>
+          </a:p>
+          <a:p>
+            <a:r>
+              <a:rPr lang="ko-KR" altLang="en-US" sz="1050" dirty="0"/>
+              <a:t>    &lt;</a:t>
+            </a:r>
+            <a:r>
+              <a:rPr lang="ko-KR" altLang="en-US" sz="1050" dirty="0" err="1"/>
+              <a:t>org.opencv.android.JavaCameraView</a:t>
+            </a:r>
+            <a:endParaRPr lang="ko-KR" altLang="en-US" sz="1050" dirty="0"/>
+          </a:p>
+          <a:p>
+            <a:r>
+              <a:rPr lang="ko-KR" altLang="en-US" sz="1050" dirty="0"/>
+              <a:t>        </a:t>
+            </a:r>
+            <a:r>
+              <a:rPr lang="ko-KR" altLang="en-US" sz="1050" dirty="0" err="1"/>
+              <a:t>android:layout_width</a:t>
+            </a:r>
+            <a:r>
+              <a:rPr lang="ko-KR" altLang="en-US" sz="1050" dirty="0"/>
+              <a:t>="</a:t>
+            </a:r>
+            <a:r>
+              <a:rPr lang="ko-KR" altLang="en-US" sz="1050" dirty="0" err="1"/>
+              <a:t>match_parent</a:t>
+            </a:r>
+            <a:r>
+              <a:rPr lang="ko-KR" altLang="en-US" sz="1050" dirty="0"/>
+              <a:t>"</a:t>
+            </a:r>
+          </a:p>
+          <a:p>
+            <a:r>
+              <a:rPr lang="ko-KR" altLang="en-US" sz="1050" dirty="0"/>
+              <a:t>        </a:t>
+            </a:r>
+            <a:r>
+              <a:rPr lang="ko-KR" altLang="en-US" sz="1050" dirty="0" err="1"/>
+              <a:t>android:layout_height</a:t>
+            </a:r>
+            <a:r>
+              <a:rPr lang="ko-KR" altLang="en-US" sz="1050" dirty="0"/>
+              <a:t>="</a:t>
+            </a:r>
+            <a:r>
+              <a:rPr lang="ko-KR" altLang="en-US" sz="1050" dirty="0" err="1"/>
+              <a:t>match_parent</a:t>
+            </a:r>
+            <a:r>
+              <a:rPr lang="ko-KR" altLang="en-US" sz="1050" dirty="0"/>
+              <a:t>"</a:t>
+            </a:r>
+          </a:p>
+          <a:p>
+            <a:r>
+              <a:rPr lang="ko-KR" altLang="en-US" sz="1050" dirty="0"/>
+              <a:t>        </a:t>
+            </a:r>
+            <a:r>
+              <a:rPr lang="ko-KR" altLang="en-US" sz="1050" dirty="0" err="1"/>
+              <a:t>android:id</a:t>
+            </a:r>
+            <a:r>
+              <a:rPr lang="ko-KR" altLang="en-US" sz="1050" dirty="0"/>
+              <a:t>="@+</a:t>
+            </a:r>
+            <a:r>
+              <a:rPr lang="ko-KR" altLang="en-US" sz="1050" dirty="0" err="1"/>
+              <a:t>id</a:t>
+            </a:r>
+            <a:r>
+              <a:rPr lang="ko-KR" altLang="en-US" sz="1050" dirty="0"/>
+              <a:t>/</a:t>
+            </a:r>
+            <a:r>
+              <a:rPr lang="ko-KR" altLang="en-US" sz="1050" dirty="0" err="1"/>
+              <a:t>camera_view</a:t>
+            </a:r>
+            <a:r>
+              <a:rPr lang="ko-KR" altLang="en-US" sz="1050" dirty="0"/>
+              <a:t>" /&gt;</a:t>
+            </a:r>
+          </a:p>
+          <a:p>
+            <a:endParaRPr lang="ko-KR" altLang="en-US" sz="1050" dirty="0"/>
+          </a:p>
+          <a:p>
+            <a:r>
+              <a:rPr lang="ko-KR" altLang="en-US" sz="1050" dirty="0"/>
+              <a:t>&lt;/</a:t>
+            </a:r>
+            <a:r>
+              <a:rPr lang="ko-KR" altLang="en-US" sz="1050" dirty="0" err="1"/>
+              <a:t>LinearLayout</a:t>
+            </a:r>
+            <a:r>
+              <a:rPr lang="ko-KR" altLang="en-US" sz="1050" dirty="0"/>
+              <a:t>&gt;</a:t>
+            </a:r>
+          </a:p>
+        </p:txBody>
+      </p:sp>
     </p:spTree>
     <p:extLst>
       <p:ext uri="{BB962C8B-B14F-4D97-AF65-F5344CB8AC3E}">
-        <p14:creationId xmlns:p14="http://schemas.microsoft.com/office/powerpoint/2010/main" val="2610458175"/>
+        <p14:creationId xmlns:p14="http://schemas.microsoft.com/office/powerpoint/2010/main" val="140618883"/>
       </p:ext>
     </p:extLst>
   </p:cSld>

</xml_diff>